<commit_message>
Updated pptx and added image of braccio-BD1
</commit_message>
<xml_diff>
--- a/doc/SplashScreen.pptx
+++ b/doc/SplashScreen.pptx
@@ -5,13 +5,14 @@
     <p:sldMasterId id="2147483648" r:id="rId1"/>
   </p:sldMasterIdLst>
   <p:notesMasterIdLst>
-    <p:notesMasterId r:id="rId4"/>
+    <p:notesMasterId r:id="rId5"/>
   </p:notesMasterIdLst>
   <p:handoutMasterIdLst>
-    <p:handoutMasterId r:id="rId5"/>
+    <p:handoutMasterId r:id="rId6"/>
   </p:handoutMasterIdLst>
   <p:sldIdLst>
     <p:sldId id="256" r:id="rId3"/>
+    <p:sldId id="257" r:id="rId4"/>
   </p:sldIdLst>
   <p:sldSz cx="12192000" cy="6858000"/>
   <p:notesSz cx="7103745" cy="10234295"/>
@@ -3809,6 +3810,182 @@
           </a:p>
         </p:txBody>
       </p:sp>
+    </p:spTree>
+  </p:cSld>
+  <p:clrMapOvr>
+    <a:masterClrMapping/>
+  </p:clrMapOvr>
+</p:sld>
+</file>
+
+<file path=ppt/slides/slide2.xml><?xml version="1.0" encoding="utf-8"?>
+<p:sld xmlns:a="http://schemas.openxmlformats.org/drawingml/2006/main" xmlns:r="http://schemas.openxmlformats.org/officeDocument/2006/relationships" xmlns:p="http://schemas.openxmlformats.org/presentationml/2006/main">
+  <p:cSld>
+    <p:spTree>
+      <p:nvGrpSpPr>
+        <p:cNvPr id="1" name=""/>
+        <p:cNvGrpSpPr/>
+        <p:nvPr/>
+      </p:nvGrpSpPr>
+      <p:grpSpPr>
+        <a:xfrm>
+          <a:off x="0" y="0"/>
+          <a:ext cx="0" cy="0"/>
+          <a:chOff x="0" y="0"/>
+          <a:chExt cx="0" cy="0"/>
+        </a:xfrm>
+      </p:grpSpPr>
+      <p:pic>
+        <p:nvPicPr>
+          <p:cNvPr id="3" name="Picture 2" descr="BD-1"/>
+          <p:cNvPicPr>
+            <a:picLocks noChangeAspect="1"/>
+          </p:cNvPicPr>
+          <p:nvPr/>
+        </p:nvPicPr>
+        <p:blipFill>
+          <a:blip r:embed="rId1"/>
+          <a:stretch>
+            <a:fillRect/>
+          </a:stretch>
+        </p:blipFill>
+        <p:spPr>
+          <a:xfrm>
+            <a:off x="412115" y="231775"/>
+            <a:ext cx="11583035" cy="6515100"/>
+          </a:xfrm>
+          <a:prstGeom prst="rect">
+            <a:avLst/>
+          </a:prstGeom>
+        </p:spPr>
+      </p:pic>
+      <p:sp>
+        <p:nvSpPr>
+          <p:cNvPr id="4" name="Rectangles 3"/>
+          <p:cNvSpPr/>
+          <p:nvPr/>
+        </p:nvSpPr>
+        <p:spPr>
+          <a:xfrm>
+            <a:off x="2446020" y="353060"/>
+            <a:ext cx="8386445" cy="6071870"/>
+          </a:xfrm>
+          <a:prstGeom prst="rect">
+            <a:avLst/>
+          </a:prstGeom>
+        </p:spPr>
+        <p:style>
+          <a:lnRef idx="2">
+            <a:schemeClr val="dk1">
+              <a:shade val="50000"/>
+            </a:schemeClr>
+          </a:lnRef>
+          <a:fillRef idx="1">
+            <a:schemeClr val="dk1"/>
+          </a:fillRef>
+          <a:effectRef idx="0">
+            <a:schemeClr val="dk1"/>
+          </a:effectRef>
+          <a:fontRef idx="minor">
+            <a:schemeClr val="lt1"/>
+          </a:fontRef>
+        </p:style>
+        <p:txBody>
+          <a:bodyPr rtlCol="0" anchor="ctr"/>
+          <a:p>
+            <a:pPr algn="ctr"/>
+            <a:endParaRPr lang="en-US"/>
+          </a:p>
+        </p:txBody>
+      </p:sp>
+      <p:pic>
+        <p:nvPicPr>
+          <p:cNvPr id="7" name="Picture 6" descr="BD-1"/>
+          <p:cNvPicPr>
+            <a:picLocks noChangeAspect="1"/>
+          </p:cNvPicPr>
+          <p:nvPr/>
+        </p:nvPicPr>
+        <p:blipFill>
+          <a:blip r:embed="rId2"/>
+          <a:stretch>
+            <a:fillRect/>
+          </a:stretch>
+        </p:blipFill>
+        <p:spPr>
+          <a:xfrm>
+            <a:off x="3413760" y="353060"/>
+            <a:ext cx="12126595" cy="6828155"/>
+          </a:xfrm>
+          <a:prstGeom prst="rect">
+            <a:avLst/>
+          </a:prstGeom>
+        </p:spPr>
+      </p:pic>
+      <p:sp>
+        <p:nvSpPr>
+          <p:cNvPr id="9" name="Rectangles 8"/>
+          <p:cNvSpPr/>
+          <p:nvPr/>
+        </p:nvSpPr>
+        <p:spPr>
+          <a:xfrm>
+            <a:off x="7432040" y="353060"/>
+            <a:ext cx="3825875" cy="2953385"/>
+          </a:xfrm>
+          <a:prstGeom prst="rect">
+            <a:avLst/>
+          </a:prstGeom>
+        </p:spPr>
+        <p:style>
+          <a:lnRef idx="2">
+            <a:schemeClr val="dk1">
+              <a:shade val="50000"/>
+            </a:schemeClr>
+          </a:lnRef>
+          <a:fillRef idx="1">
+            <a:schemeClr val="dk1"/>
+          </a:fillRef>
+          <a:effectRef idx="0">
+            <a:schemeClr val="dk1"/>
+          </a:effectRef>
+          <a:fontRef idx="minor">
+            <a:schemeClr val="lt1"/>
+          </a:fontRef>
+        </p:style>
+        <p:txBody>
+          <a:bodyPr rtlCol="0" anchor="ctr"/>
+          <a:p>
+            <a:pPr algn="ctr"/>
+            <a:endParaRPr lang="en-US"/>
+          </a:p>
+        </p:txBody>
+      </p:sp>
+      <p:pic>
+        <p:nvPicPr>
+          <p:cNvPr id="11" name="Picture 10" descr="braccio_robot"/>
+          <p:cNvPicPr>
+            <a:picLocks noChangeAspect="1"/>
+          </p:cNvPicPr>
+          <p:nvPr/>
+        </p:nvPicPr>
+        <p:blipFill>
+          <a:blip r:embed="rId3"/>
+          <a:srcRect b="42968"/>
+          <a:stretch>
+            <a:fillRect/>
+          </a:stretch>
+        </p:blipFill>
+        <p:spPr>
+          <a:xfrm>
+            <a:off x="6880225" y="581025"/>
+            <a:ext cx="4930140" cy="2811780"/>
+          </a:xfrm>
+          <a:prstGeom prst="rect">
+            <a:avLst/>
+          </a:prstGeom>
+        </p:spPr>
+      </p:pic>
     </p:spTree>
   </p:cSld>
   <p:clrMapOvr>

</xml_diff>